<commit_message>
Raztegnjen načrt, kolikor se da
</commit_message>
<xml_diff>
--- a/Dokumentacija/Predstavitev Projekta.pptx
+++ b/Dokumentacija/Predstavitev Projekta.pptx
@@ -403,6 +403,7 @@
           <a:p>
             <a:fld id="{FAF0E1FD-A619-43FE-B6A9-B68E81301AF8}" type="datetimeFigureOut">
               <a:rPr lang="sl-SI" smtClean="0"/>
+              <a:pPr/>
               <a:t>18.11.2013</a:t>
             </a:fld>
             <a:endParaRPr lang="sl-SI"/>
@@ -471,6 +472,7 @@
           <a:p>
             <a:fld id="{8DFC2763-6D0E-45B0-87B6-A0CC626AA08A}" type="slidenum">
               <a:rPr lang="sl-SI" smtClean="0"/>
+              <a:pPr/>
               <a:t>‹#›</a:t>
             </a:fld>
             <a:endParaRPr lang="sl-SI"/>
@@ -594,6 +596,7 @@
           <a:p>
             <a:fld id="{FAF0E1FD-A619-43FE-B6A9-B68E81301AF8}" type="datetimeFigureOut">
               <a:rPr lang="sl-SI" smtClean="0"/>
+              <a:pPr/>
               <a:t>18.11.2013</a:t>
             </a:fld>
             <a:endParaRPr lang="sl-SI"/>
@@ -636,6 +639,7 @@
           <a:p>
             <a:fld id="{8DFC2763-6D0E-45B0-87B6-A0CC626AA08A}" type="slidenum">
               <a:rPr lang="sl-SI" smtClean="0"/>
+              <a:pPr/>
               <a:t>‹#›</a:t>
             </a:fld>
             <a:endParaRPr lang="sl-SI"/>
@@ -779,6 +783,7 @@
           <a:p>
             <a:fld id="{FAF0E1FD-A619-43FE-B6A9-B68E81301AF8}" type="datetimeFigureOut">
               <a:rPr lang="sl-SI" smtClean="0"/>
+              <a:pPr/>
               <a:t>18.11.2013</a:t>
             </a:fld>
             <a:endParaRPr lang="sl-SI"/>
@@ -966,6 +971,7 @@
           <a:p>
             <a:fld id="{8DFC2763-6D0E-45B0-87B6-A0CC626AA08A}" type="slidenum">
               <a:rPr lang="sl-SI" smtClean="0"/>
+              <a:pPr/>
               <a:t>‹#›</a:t>
             </a:fld>
             <a:endParaRPr lang="sl-SI"/>
@@ -1042,6 +1048,7 @@
           <a:p>
             <a:fld id="{FAF0E1FD-A619-43FE-B6A9-B68E81301AF8}" type="datetimeFigureOut">
               <a:rPr lang="sl-SI" smtClean="0"/>
+              <a:pPr/>
               <a:t>18.11.2013</a:t>
             </a:fld>
             <a:endParaRPr lang="sl-SI"/>
@@ -1092,6 +1099,7 @@
           <a:p>
             <a:fld id="{8DFC2763-6D0E-45B0-87B6-A0CC626AA08A}" type="slidenum">
               <a:rPr lang="sl-SI" smtClean="0"/>
+              <a:pPr/>
               <a:t>‹#›</a:t>
             </a:fld>
             <a:endParaRPr lang="sl-SI"/>
@@ -1458,6 +1466,7 @@
           <a:p>
             <a:fld id="{FAF0E1FD-A619-43FE-B6A9-B68E81301AF8}" type="datetimeFigureOut">
               <a:rPr lang="sl-SI" smtClean="0"/>
+              <a:pPr/>
               <a:t>18.11.2013</a:t>
             </a:fld>
             <a:endParaRPr lang="sl-SI"/>
@@ -1496,6 +1505,7 @@
           <a:p>
             <a:fld id="{8DFC2763-6D0E-45B0-87B6-A0CC626AA08A}" type="slidenum">
               <a:rPr lang="sl-SI" smtClean="0"/>
+              <a:pPr/>
               <a:t>‹#›</a:t>
             </a:fld>
             <a:endParaRPr lang="sl-SI"/>
@@ -1700,6 +1710,7 @@
           <a:p>
             <a:fld id="{FAF0E1FD-A619-43FE-B6A9-B68E81301AF8}" type="datetimeFigureOut">
               <a:rPr lang="sl-SI" smtClean="0"/>
+              <a:pPr/>
               <a:t>18.11.2013</a:t>
             </a:fld>
             <a:endParaRPr lang="sl-SI"/>
@@ -1723,6 +1734,7 @@
           <a:p>
             <a:fld id="{8DFC2763-6D0E-45B0-87B6-A0CC626AA08A}" type="slidenum">
               <a:rPr lang="sl-SI" smtClean="0"/>
+              <a:pPr/>
               <a:t>‹#›</a:t>
             </a:fld>
             <a:endParaRPr lang="sl-SI"/>
@@ -1936,6 +1948,7 @@
           <a:p>
             <a:fld id="{FAF0E1FD-A619-43FE-B6A9-B68E81301AF8}" type="datetimeFigureOut">
               <a:rPr lang="sl-SI" smtClean="0"/>
+              <a:pPr/>
               <a:t>18.11.2013</a:t>
             </a:fld>
             <a:endParaRPr lang="sl-SI"/>
@@ -1959,6 +1972,7 @@
           <a:p>
             <a:fld id="{8DFC2763-6D0E-45B0-87B6-A0CC626AA08A}" type="slidenum">
               <a:rPr lang="sl-SI" smtClean="0"/>
+              <a:pPr/>
               <a:t>‹#›</a:t>
             </a:fld>
             <a:endParaRPr lang="sl-SI"/>
@@ -2131,6 +2145,7 @@
           <a:p>
             <a:fld id="{FAF0E1FD-A619-43FE-B6A9-B68E81301AF8}" type="datetimeFigureOut">
               <a:rPr lang="sl-SI" smtClean="0"/>
+              <a:pPr/>
               <a:t>18.11.2013</a:t>
             </a:fld>
             <a:endParaRPr lang="sl-SI"/>
@@ -2181,6 +2196,7 @@
           <a:p>
             <a:fld id="{8DFC2763-6D0E-45B0-87B6-A0CC626AA08A}" type="slidenum">
               <a:rPr lang="sl-SI" smtClean="0"/>
+              <a:pPr/>
               <a:t>‹#›</a:t>
             </a:fld>
             <a:endParaRPr lang="sl-SI"/>
@@ -2229,6 +2245,7 @@
           <a:p>
             <a:fld id="{FAF0E1FD-A619-43FE-B6A9-B68E81301AF8}" type="datetimeFigureOut">
               <a:rPr lang="sl-SI" smtClean="0"/>
+              <a:pPr/>
               <a:t>18.11.2013</a:t>
             </a:fld>
             <a:endParaRPr lang="sl-SI"/>
@@ -2284,6 +2301,7 @@
           <a:p>
             <a:fld id="{8DFC2763-6D0E-45B0-87B6-A0CC626AA08A}" type="slidenum">
               <a:rPr lang="sl-SI" smtClean="0"/>
+              <a:pPr/>
               <a:t>‹#›</a:t>
             </a:fld>
             <a:endParaRPr lang="sl-SI"/>
@@ -2365,6 +2383,7 @@
           <a:p>
             <a:fld id="{FAF0E1FD-A619-43FE-B6A9-B68E81301AF8}" type="datetimeFigureOut">
               <a:rPr lang="sl-SI" smtClean="0"/>
+              <a:pPr/>
               <a:t>18.11.2013</a:t>
             </a:fld>
             <a:endParaRPr lang="sl-SI"/>
@@ -2415,6 +2434,7 @@
           <a:p>
             <a:fld id="{8DFC2763-6D0E-45B0-87B6-A0CC626AA08A}" type="slidenum">
               <a:rPr lang="sl-SI" smtClean="0"/>
+              <a:pPr/>
               <a:t>‹#›</a:t>
             </a:fld>
             <a:endParaRPr lang="sl-SI"/>
@@ -2883,6 +2903,7 @@
           <a:p>
             <a:fld id="{FAF0E1FD-A619-43FE-B6A9-B68E81301AF8}" type="datetimeFigureOut">
               <a:rPr lang="sl-SI" smtClean="0"/>
+              <a:pPr/>
               <a:t>18.11.2013</a:t>
             </a:fld>
             <a:endParaRPr lang="sl-SI"/>
@@ -2915,6 +2936,7 @@
           <a:p>
             <a:fld id="{8DFC2763-6D0E-45B0-87B6-A0CC626AA08A}" type="slidenum">
               <a:rPr lang="sl-SI" smtClean="0"/>
+              <a:pPr/>
               <a:t>‹#›</a:t>
             </a:fld>
             <a:endParaRPr lang="sl-SI"/>
@@ -3144,6 +3166,7 @@
           <a:p>
             <a:fld id="{FAF0E1FD-A619-43FE-B6A9-B68E81301AF8}" type="datetimeFigureOut">
               <a:rPr lang="sl-SI" smtClean="0"/>
+              <a:pPr/>
               <a:t>18.11.2013</a:t>
             </a:fld>
             <a:endParaRPr lang="sl-SI"/>
@@ -3362,6 +3385,7 @@
           <a:p>
             <a:fld id="{8DFC2763-6D0E-45B0-87B6-A0CC626AA08A}" type="slidenum">
               <a:rPr lang="sl-SI" smtClean="0"/>
+              <a:pPr/>
               <a:t>‹#›</a:t>
             </a:fld>
             <a:endParaRPr lang="sl-SI"/>
@@ -4145,8 +4169,8 @@
         </p:blipFill>
         <p:spPr>
           <a:xfrm>
-            <a:off x="612775" y="2150112"/>
-            <a:ext cx="8153400" cy="3395975"/>
+            <a:off x="0" y="1500174"/>
+            <a:ext cx="9776388" cy="4071966"/>
           </a:xfrm>
         </p:spPr>
       </p:pic>
@@ -4224,7 +4248,6 @@
               <a:rPr lang="sl-SI" dirty="0" smtClean="0"/>
               <a:t>Google Play</a:t>
             </a:r>
-            <a:endParaRPr lang="sl-SI" dirty="0" smtClean="0"/>
           </a:p>
           <a:p>
             <a:pPr lvl="1"/>

</xml_diff>